<commit_message>
Info about Visual Studio extensions
</commit_message>
<xml_diff>
--- a/Presentation/lesson-10-adonet.pptx
+++ b/Presentation/lesson-10-adonet.pptx
@@ -5,7 +5,7 @@
     <p:sldMasterId id="2147483648" r:id="rId1"/>
   </p:sldMasterIdLst>
   <p:notesMasterIdLst>
-    <p:notesMasterId r:id="rId37"/>
+    <p:notesMasterId r:id="rId38"/>
   </p:notesMasterIdLst>
   <p:sldIdLst>
     <p:sldId id="257" r:id="rId2"/>
@@ -42,7 +42,8 @@
     <p:sldId id="291" r:id="rId33"/>
     <p:sldId id="292" r:id="rId34"/>
     <p:sldId id="295" r:id="rId35"/>
-    <p:sldId id="293" r:id="rId36"/>
+    <p:sldId id="296" r:id="rId36"/>
+    <p:sldId id="293" r:id="rId37"/>
   </p:sldIdLst>
   <p:sldSz cx="9144000" cy="6858000" type="screen4x3"/>
   <p:notesSz cx="6858000" cy="9144000"/>
@@ -226,7 +227,7 @@
           <a:p>
             <a:fld id="{B24A7054-7FFB-49F4-A126-5DF6E687FF53}" type="datetimeFigureOut">
               <a:rPr lang="ru-RU" smtClean="0"/>
-              <a:t>22.10.2013</a:t>
+              <a:t>26.10.2013</a:t>
             </a:fld>
             <a:endParaRPr lang="ru-RU"/>
           </a:p>
@@ -1289,7 +1290,7 @@
           <a:p>
             <a:fld id="{8E6E6A2A-E9D3-4A0D-B04A-ABDD367A1E08}" type="datetimeFigureOut">
               <a:rPr lang="ru-RU" smtClean="0"/>
-              <a:t>22.10.2013</a:t>
+              <a:t>26.10.2013</a:t>
             </a:fld>
             <a:endParaRPr lang="ru-RU"/>
           </a:p>
@@ -2737,7 +2738,7 @@
           <a:p>
             <a:fld id="{AC3D3127-B7C4-45E3-9797-C527EC9FDD78}" type="datetimeFigureOut">
               <a:rPr lang="ru-RU" smtClean="0"/>
-              <a:t>22.10.2013</a:t>
+              <a:t>26.10.2013</a:t>
             </a:fld>
             <a:endParaRPr lang="ru-RU"/>
           </a:p>
@@ -34217,6 +34218,295 @@
 </file>
 
 <file path=ppt/slides/slide35.xml><?xml version="1.0" encoding="utf-8"?>
+<p:sld xmlns:a="http://schemas.openxmlformats.org/drawingml/2006/main" xmlns:r="http://schemas.openxmlformats.org/officeDocument/2006/relationships" xmlns:p="http://schemas.openxmlformats.org/presentationml/2006/main">
+  <p:cSld>
+    <p:spTree>
+      <p:nvGrpSpPr>
+        <p:cNvPr id="1" name=""/>
+        <p:cNvGrpSpPr/>
+        <p:nvPr/>
+      </p:nvGrpSpPr>
+      <p:grpSpPr>
+        <a:xfrm>
+          <a:off x="0" y="0"/>
+          <a:ext cx="0" cy="0"/>
+          <a:chOff x="0" y="0"/>
+          <a:chExt cx="0" cy="0"/>
+        </a:xfrm>
+      </p:grpSpPr>
+      <p:sp>
+        <p:nvSpPr>
+          <p:cNvPr id="2" name="Title 1"/>
+          <p:cNvSpPr>
+            <a:spLocks noGrp="1"/>
+          </p:cNvSpPr>
+          <p:nvPr>
+            <p:ph type="title"/>
+          </p:nvPr>
+        </p:nvSpPr>
+        <p:spPr/>
+        <p:txBody>
+          <a:bodyPr/>
+          <a:lstStyle/>
+          <a:p>
+            <a:r>
+              <a:rPr lang="en-US" dirty="0" smtClean="0"/>
+              <a:t>EF: </a:t>
+            </a:r>
+            <a:r>
+              <a:rPr lang="ru-RU" dirty="0" smtClean="0"/>
+              <a:t>Расширения для </a:t>
+            </a:r>
+            <a:r>
+              <a:rPr lang="en-US" dirty="0" smtClean="0"/>
+              <a:t>Visual Studio</a:t>
+            </a:r>
+            <a:endParaRPr lang="ru-RU" dirty="0"/>
+          </a:p>
+        </p:txBody>
+      </p:sp>
+      <p:sp>
+        <p:nvSpPr>
+          <p:cNvPr id="3" name="Content Placeholder 2"/>
+          <p:cNvSpPr>
+            <a:spLocks noGrp="1"/>
+          </p:cNvSpPr>
+          <p:nvPr>
+            <p:ph idx="1"/>
+          </p:nvPr>
+        </p:nvSpPr>
+        <p:spPr/>
+        <p:txBody>
+          <a:bodyPr>
+            <a:normAutofit fontScale="47500" lnSpcReduction="20000"/>
+          </a:bodyPr>
+          <a:lstStyle/>
+          <a:p>
+            <a:pPr marL="0" indent="0">
+              <a:buNone/>
+            </a:pPr>
+            <a:r>
+              <a:rPr lang="en-US" dirty="0"/>
+              <a:t>Entity Framework Power Tools Beta </a:t>
+            </a:r>
+            <a:r>
+              <a:rPr lang="en-US" dirty="0" smtClean="0"/>
+              <a:t>4</a:t>
+            </a:r>
+          </a:p>
+          <a:p>
+            <a:pPr marL="0" indent="0">
+              <a:buNone/>
+            </a:pPr>
+            <a:r>
+              <a:rPr lang="en-US" dirty="0">
+                <a:hlinkClick r:id="rId2"/>
+              </a:rPr>
+              <a:t>http://</a:t>
+            </a:r>
+            <a:r>
+              <a:rPr lang="en-US" dirty="0" smtClean="0">
+                <a:hlinkClick r:id="rId2"/>
+              </a:rPr>
+              <a:t>visualstudiogallery.msdn.microsoft.com/72a60b14-1581-4b9b-89f2-846072eff19d</a:t>
+            </a:r>
+            <a:endParaRPr lang="en-US" dirty="0" smtClean="0"/>
+          </a:p>
+          <a:p>
+            <a:pPr marL="0" indent="0">
+              <a:buNone/>
+            </a:pPr>
+            <a:endParaRPr lang="en-US" dirty="0" smtClean="0"/>
+          </a:p>
+          <a:p>
+            <a:pPr marL="0" indent="0">
+              <a:buNone/>
+            </a:pPr>
+            <a:r>
+              <a:rPr lang="ru-RU" dirty="0" smtClean="0"/>
+              <a:t>Контекстное меню для </a:t>
+            </a:r>
+            <a:r>
+              <a:rPr lang="en-US" dirty="0" smtClean="0"/>
+              <a:t>C# </a:t>
+            </a:r>
+            <a:r>
+              <a:rPr lang="ru-RU" dirty="0" smtClean="0"/>
+              <a:t>проектов:</a:t>
+            </a:r>
+          </a:p>
+          <a:p>
+            <a:pPr lvl="1"/>
+            <a:r>
+              <a:rPr lang="en-US" dirty="0" smtClean="0"/>
+              <a:t>Reverse </a:t>
+            </a:r>
+            <a:r>
+              <a:rPr lang="en-US" dirty="0"/>
+              <a:t>Engineer Code First - Generates POCO classes, derived </a:t>
+            </a:r>
+            <a:r>
+              <a:rPr lang="en-US" dirty="0" err="1"/>
+              <a:t>DbContext</a:t>
+            </a:r>
+            <a:r>
+              <a:rPr lang="en-US" dirty="0"/>
+              <a:t> and Code First mapping for an existing database. </a:t>
+            </a:r>
+            <a:endParaRPr lang="ru-RU" dirty="0" smtClean="0"/>
+          </a:p>
+          <a:p>
+            <a:pPr lvl="1"/>
+            <a:r>
+              <a:rPr lang="en-US" dirty="0" smtClean="0"/>
+              <a:t>Customize </a:t>
+            </a:r>
+            <a:r>
+              <a:rPr lang="en-US" dirty="0"/>
+              <a:t>Reverse Engineer Templates - Adds the default reverse engineer T4 templates to your project for editing. </a:t>
+            </a:r>
+            <a:endParaRPr lang="ru-RU" dirty="0" smtClean="0"/>
+          </a:p>
+          <a:p>
+            <a:pPr lvl="1"/>
+            <a:endParaRPr lang="en-US" dirty="0"/>
+          </a:p>
+          <a:p>
+            <a:pPr marL="0" indent="0">
+              <a:buNone/>
+            </a:pPr>
+            <a:r>
+              <a:rPr lang="en-US" dirty="0"/>
+              <a:t>When right-clicking on a file containing a derived </a:t>
+            </a:r>
+            <a:r>
+              <a:rPr lang="en-US" dirty="0" err="1"/>
+              <a:t>DbContext</a:t>
+            </a:r>
+            <a:r>
+              <a:rPr lang="en-US" dirty="0"/>
+              <a:t> class, the following context menu functions are </a:t>
+            </a:r>
+            <a:r>
+              <a:rPr lang="en-US" dirty="0" smtClean="0"/>
+              <a:t>supported:</a:t>
+            </a:r>
+            <a:endParaRPr lang="ru-RU" dirty="0" smtClean="0"/>
+          </a:p>
+          <a:p>
+            <a:pPr lvl="1"/>
+            <a:r>
+              <a:rPr lang="en-US" dirty="0" smtClean="0"/>
+              <a:t>View </a:t>
+            </a:r>
+            <a:r>
+              <a:rPr lang="en-US" dirty="0"/>
+              <a:t>Entity Data Model (Read-only) - Displays a read-only view of the Code First model in the Entity Model Designer. </a:t>
+            </a:r>
+            <a:endParaRPr lang="ru-RU" dirty="0" smtClean="0"/>
+          </a:p>
+          <a:p>
+            <a:pPr lvl="1"/>
+            <a:r>
+              <a:rPr lang="en-US" dirty="0" smtClean="0"/>
+              <a:t>View </a:t>
+            </a:r>
+            <a:r>
+              <a:rPr lang="en-US" dirty="0"/>
+              <a:t>Entity Data Model XML - Displays the EDMX XML representing the underlying Code First model. </a:t>
+            </a:r>
+            <a:endParaRPr lang="ru-RU" dirty="0" smtClean="0"/>
+          </a:p>
+          <a:p>
+            <a:pPr lvl="1"/>
+            <a:r>
+              <a:rPr lang="en-US" dirty="0" smtClean="0"/>
+              <a:t>View </a:t>
+            </a:r>
+            <a:r>
+              <a:rPr lang="en-US" dirty="0"/>
+              <a:t>Entity Data Model DDL SQL - Displays the DDL SQL corresponding to the SSDL in the underlying EDM </a:t>
+            </a:r>
+            <a:r>
+              <a:rPr lang="en-US" dirty="0" smtClean="0"/>
+              <a:t>Model.</a:t>
+            </a:r>
+            <a:endParaRPr lang="ru-RU" dirty="0" smtClean="0"/>
+          </a:p>
+          <a:p>
+            <a:pPr lvl="1"/>
+            <a:r>
+              <a:rPr lang="en-US" dirty="0" smtClean="0"/>
+              <a:t>Generate </a:t>
+            </a:r>
+            <a:r>
+              <a:rPr lang="en-US" dirty="0"/>
+              <a:t>Views - Generates pre-compiled views used by the EF runtime to improve start-up performance. Adds the generated views file to the containing project</a:t>
+            </a:r>
+            <a:r>
+              <a:rPr lang="en-US" dirty="0" smtClean="0"/>
+              <a:t>.</a:t>
+            </a:r>
+            <a:endParaRPr lang="ru-RU" dirty="0" smtClean="0"/>
+          </a:p>
+          <a:p>
+            <a:pPr lvl="1"/>
+            <a:endParaRPr lang="en-US" dirty="0"/>
+          </a:p>
+          <a:p>
+            <a:pPr marL="0" indent="0">
+              <a:buNone/>
+            </a:pPr>
+            <a:r>
+              <a:rPr lang="en-US" dirty="0"/>
+              <a:t>When right-clicking on an Entity Data Model (*.</a:t>
+            </a:r>
+            <a:r>
+              <a:rPr lang="en-US" dirty="0" err="1"/>
+              <a:t>edmx</a:t>
+            </a:r>
+            <a:r>
+              <a:rPr lang="en-US" dirty="0"/>
+              <a:t>) file, the following context menu function is </a:t>
+            </a:r>
+            <a:r>
+              <a:rPr lang="en-US" dirty="0" smtClean="0"/>
+              <a:t>supported:</a:t>
+            </a:r>
+            <a:endParaRPr lang="ru-RU" dirty="0" smtClean="0"/>
+          </a:p>
+          <a:p>
+            <a:pPr lvl="1"/>
+            <a:r>
+              <a:rPr lang="en-US" dirty="0" smtClean="0"/>
+              <a:t>Generate </a:t>
+            </a:r>
+            <a:r>
+              <a:rPr lang="en-US" dirty="0"/>
+              <a:t>Views - Generates pre-compiled views used by the EF runtime to improve start-up performance. Adds the generated views file to the containing project</a:t>
+            </a:r>
+            <a:r>
+              <a:rPr lang="en-US" dirty="0" smtClean="0"/>
+              <a:t>.</a:t>
+            </a:r>
+            <a:endParaRPr lang="ru-RU" dirty="0"/>
+          </a:p>
+        </p:txBody>
+      </p:sp>
+    </p:spTree>
+    <p:extLst>
+      <p:ext uri="{BB962C8B-B14F-4D97-AF65-F5344CB8AC3E}">
+        <p14:creationId xmlns:p14="http://schemas.microsoft.com/office/powerpoint/2010/main" val="2835828466"/>
+      </p:ext>
+    </p:extLst>
+  </p:cSld>
+  <p:clrMapOvr>
+    <a:masterClrMapping/>
+  </p:clrMapOvr>
+</p:sld>
+</file>
+
+<file path=ppt/slides/slide36.xml><?xml version="1.0" encoding="utf-8"?>
 <p:sld xmlns:a="http://schemas.openxmlformats.org/drawingml/2006/main" xmlns:r="http://schemas.openxmlformats.org/officeDocument/2006/relationships" xmlns:p="http://schemas.openxmlformats.org/presentationml/2006/main">
   <p:cSld>
     <p:spTree>

</xml_diff>

<commit_message>
Added PK requirement to EF slide
</commit_message>
<xml_diff>
--- a/Presentation/lesson-10-adonet.pptx
+++ b/Presentation/lesson-10-adonet.pptx
@@ -144,7 +144,7 @@
   </p:defaultTextStyle>
   <p:extLst>
     <p:ext uri="{EFAFB233-063F-42B5-8137-9DF3F51BA10A}">
-      <p15:sldGuideLst xmlns:p15="http://schemas.microsoft.com/office/powerpoint/2012/main">
+      <p15:sldGuideLst xmlns:p15="http://schemas.microsoft.com/office/powerpoint/2012/main" xmlns="">
         <p15:guide id="1" orient="horz" pos="2160">
           <p15:clr>
             <a:srgbClr val="A4A3A4"/>
@@ -243,7 +243,7 @@
           <a:p>
             <a:fld id="{B24A7054-7FFB-49F4-A126-5DF6E687FF53}" type="datetimeFigureOut">
               <a:rPr lang="ru-RU" smtClean="0"/>
-              <a:t>26.11.2013</a:t>
+              <a:t>13.05.2014</a:t>
             </a:fld>
             <a:endParaRPr lang="ru-RU"/>
           </a:p>
@@ -1306,7 +1306,7 @@
           <a:p>
             <a:fld id="{8E6E6A2A-E9D3-4A0D-B04A-ABDD367A1E08}" type="datetimeFigureOut">
               <a:rPr lang="ru-RU" smtClean="0"/>
-              <a:t>26.11.2013</a:t>
+              <a:t>13.05.2014</a:t>
             </a:fld>
             <a:endParaRPr lang="ru-RU"/>
           </a:p>
@@ -2754,7 +2754,7 @@
           <a:p>
             <a:fld id="{AC3D3127-B7C4-45E3-9797-C527EC9FDD78}" type="datetimeFigureOut">
               <a:rPr lang="ru-RU" smtClean="0"/>
-              <a:t>26.11.2013</a:t>
+              <a:t>13.05.2014</a:t>
             </a:fld>
             <a:endParaRPr lang="ru-RU"/>
           </a:p>
@@ -33923,6 +33923,29 @@
               <a:t>БД</a:t>
             </a:r>
             <a:endParaRPr lang="en-US" dirty="0" smtClean="0"/>
+          </a:p>
+          <a:p>
+            <a:r>
+              <a:rPr lang="ru-RU" dirty="0" smtClean="0">
+                <a:solidFill>
+                  <a:srgbClr val="FFFF00"/>
+                </a:solidFill>
+              </a:rPr>
+              <a:t>Для корректной работы требует наличие </a:t>
+            </a:r>
+            <a:r>
+              <a:rPr lang="en-US" dirty="0" smtClean="0">
+                <a:solidFill>
+                  <a:srgbClr val="FFFF00"/>
+                </a:solidFill>
+              </a:rPr>
+              <a:t>PK</a:t>
+            </a:r>
+            <a:endParaRPr lang="en-US" dirty="0" smtClean="0">
+              <a:solidFill>
+                <a:srgbClr val="FFFF00"/>
+              </a:solidFill>
+            </a:endParaRPr>
           </a:p>
           <a:p>
             <a:r>

</xml_diff>